<commit_message>
Remove dúvida apresentação notebook. Insere apresentação do artigo
</commit_message>
<xml_diff>
--- a/2 - classificador binario - reranking com minilm/notebook/apresentacao_notebook.pptx
+++ b/2 - classificador binario - reranking com minilm/notebook/apresentacao_notebook.pptx
@@ -10226,8 +10226,8 @@
         </p:nvSpPr>
         <p:spPr>
           <a:xfrm>
-            <a:off x="241308" y="2014809"/>
-            <a:ext cx="5854692" cy="4092376"/>
+            <a:off x="241308" y="2562045"/>
+            <a:ext cx="5854692" cy="3545140"/>
           </a:xfrm>
           <a:prstGeom prst="rect">
             <a:avLst/>
@@ -10347,8 +10347,8 @@
         </p:nvSpPr>
         <p:spPr>
           <a:xfrm>
-            <a:off x="6230798" y="2014809"/>
-            <a:ext cx="5854692" cy="4092376"/>
+            <a:off x="6230798" y="2562043"/>
+            <a:ext cx="5854692" cy="3545141"/>
           </a:xfrm>
           <a:prstGeom prst="rect">
             <a:avLst/>
@@ -10398,7 +10398,7 @@
         </p:nvSpPr>
         <p:spPr>
           <a:xfrm>
-            <a:off x="371695" y="1426128"/>
+            <a:off x="371695" y="2038601"/>
             <a:ext cx="5710107" cy="444617"/>
           </a:xfrm>
           <a:prstGeom prst="rect">
@@ -10636,7 +10636,7 @@
         </p:nvSpPr>
         <p:spPr>
           <a:xfrm>
-            <a:off x="6239187" y="1426128"/>
+            <a:off x="6239187" y="2038601"/>
             <a:ext cx="5952813" cy="444617"/>
           </a:xfrm>
           <a:prstGeom prst="rect">
@@ -10874,8 +10874,8 @@
         </p:nvSpPr>
         <p:spPr>
           <a:xfrm>
-            <a:off x="655522" y="2080523"/>
-            <a:ext cx="4840448" cy="1939175"/>
+            <a:off x="655522" y="2675741"/>
+            <a:ext cx="4840448" cy="1683365"/>
           </a:xfrm>
           <a:prstGeom prst="rect">
             <a:avLst/>
@@ -11204,8 +11204,8 @@
         </p:nvSpPr>
         <p:spPr>
           <a:xfrm>
-            <a:off x="6662419" y="2073639"/>
-            <a:ext cx="4840448" cy="1946059"/>
+            <a:off x="6662419" y="2668857"/>
+            <a:ext cx="4840448" cy="1690249"/>
           </a:xfrm>
           <a:prstGeom prst="rect">
             <a:avLst/>
@@ -11534,7 +11534,7 @@
         </p:nvSpPr>
         <p:spPr>
           <a:xfrm>
-            <a:off x="641757" y="4163762"/>
+            <a:off x="641757" y="4517444"/>
             <a:ext cx="4840448" cy="1683365"/>
           </a:xfrm>
           <a:prstGeom prst="rect">
@@ -11824,7 +11824,7 @@
         </p:nvSpPr>
         <p:spPr>
           <a:xfrm>
-            <a:off x="6599339" y="4185633"/>
+            <a:off x="6599339" y="4530681"/>
             <a:ext cx="4840448" cy="1812495"/>
           </a:xfrm>
           <a:prstGeom prst="rect">
@@ -12194,6 +12194,312 @@
             <a:r>
               <a:rPr lang="pt-BR" dirty="0"/>
               <a:t> tivesse um efeito tão grande no nDCG@10</a:t>
+            </a:r>
+          </a:p>
+        </p:txBody>
+      </p:sp>
+      <p:cxnSp>
+        <p:nvCxnSpPr>
+          <p:cNvPr id="6" name="Conector reto 5">
+            <a:extLst>
+              <a:ext uri="{FF2B5EF4-FFF2-40B4-BE49-F238E27FC236}">
+                <a16:creationId xmlns:a16="http://schemas.microsoft.com/office/drawing/2014/main" id="{C62EA04F-00A0-B4BE-D1F7-AD66BE47AF92}"/>
+              </a:ext>
+            </a:extLst>
+          </p:cNvPr>
+          <p:cNvCxnSpPr>
+            <a:stCxn id="25" idx="1"/>
+            <a:endCxn id="25" idx="3"/>
+          </p:cNvCxnSpPr>
+          <p:nvPr/>
+        </p:nvCxnSpPr>
+        <p:spPr>
+          <a:xfrm>
+            <a:off x="241308" y="4334615"/>
+            <a:ext cx="5854692" cy="0"/>
+          </a:xfrm>
+          <a:prstGeom prst="line">
+            <a:avLst/>
+          </a:prstGeom>
+        </p:spPr>
+        <p:style>
+          <a:lnRef idx="1">
+            <a:schemeClr val="accent1"/>
+          </a:lnRef>
+          <a:fillRef idx="0">
+            <a:schemeClr val="accent1"/>
+          </a:fillRef>
+          <a:effectRef idx="0">
+            <a:schemeClr val="accent1"/>
+          </a:effectRef>
+          <a:fontRef idx="minor">
+            <a:schemeClr val="tx1"/>
+          </a:fontRef>
+        </p:style>
+      </p:cxnSp>
+      <p:cxnSp>
+        <p:nvCxnSpPr>
+          <p:cNvPr id="8" name="Conector reto 7">
+            <a:extLst>
+              <a:ext uri="{FF2B5EF4-FFF2-40B4-BE49-F238E27FC236}">
+                <a16:creationId xmlns:a16="http://schemas.microsoft.com/office/drawing/2014/main" id="{FFF69778-882C-1808-646C-DE7BAE730D58}"/>
+              </a:ext>
+            </a:extLst>
+          </p:cNvPr>
+          <p:cNvCxnSpPr>
+            <a:stCxn id="26" idx="1"/>
+            <a:endCxn id="26" idx="3"/>
+          </p:cNvCxnSpPr>
+          <p:nvPr/>
+        </p:nvCxnSpPr>
+        <p:spPr>
+          <a:xfrm>
+            <a:off x="6230798" y="4334614"/>
+            <a:ext cx="5854692" cy="0"/>
+          </a:xfrm>
+          <a:prstGeom prst="line">
+            <a:avLst/>
+          </a:prstGeom>
+        </p:spPr>
+        <p:style>
+          <a:lnRef idx="1">
+            <a:schemeClr val="accent1"/>
+          </a:lnRef>
+          <a:fillRef idx="0">
+            <a:schemeClr val="accent1"/>
+          </a:fillRef>
+          <a:effectRef idx="0">
+            <a:schemeClr val="accent1"/>
+          </a:effectRef>
+          <a:fontRef idx="minor">
+            <a:schemeClr val="tx1"/>
+          </a:fontRef>
+        </p:style>
+      </p:cxnSp>
+      <p:sp>
+        <p:nvSpPr>
+          <p:cNvPr id="16" name="Espaço Reservado para Conteúdo 3">
+            <a:extLst>
+              <a:ext uri="{FF2B5EF4-FFF2-40B4-BE49-F238E27FC236}">
+                <a16:creationId xmlns:a16="http://schemas.microsoft.com/office/drawing/2014/main" id="{95F2317F-14D5-72AF-6A21-869ADF5CB4A4}"/>
+              </a:ext>
+            </a:extLst>
+          </p:cNvPr>
+          <p:cNvSpPr txBox="1">
+            <a:spLocks/>
+          </p:cNvSpPr>
+          <p:nvPr/>
+        </p:nvSpPr>
+        <p:spPr>
+          <a:xfrm>
+            <a:off x="313600" y="1212673"/>
+            <a:ext cx="11771890" cy="444617"/>
+          </a:xfrm>
+          <a:prstGeom prst="rect">
+            <a:avLst/>
+          </a:prstGeom>
+        </p:spPr>
+        <p:txBody>
+          <a:bodyPr rtlCol="0">
+            <a:normAutofit fontScale="77500" lnSpcReduction="20000"/>
+          </a:bodyPr>
+          <a:lstStyle>
+            <a:lvl1pPr marL="228600" indent="-228600" algn="l" defTabSz="914400" rtl="0" eaLnBrk="1" latinLnBrk="0" hangingPunct="1">
+              <a:lnSpc>
+                <a:spcPct val="90000"/>
+              </a:lnSpc>
+              <a:spcBef>
+                <a:spcPts val="1000"/>
+              </a:spcBef>
+              <a:buFont typeface="Arial" panose="020B0604020202020204" pitchFamily="34" charset="0"/>
+              <a:buChar char="•"/>
+              <a:defRPr sz="2800" kern="1200">
+                <a:solidFill>
+                  <a:schemeClr val="tx1"/>
+                </a:solidFill>
+                <a:latin typeface="+mn-lt"/>
+                <a:ea typeface="+mn-ea"/>
+                <a:cs typeface="+mn-cs"/>
+              </a:defRPr>
+            </a:lvl1pPr>
+            <a:lvl2pPr marL="685800" indent="-228600" algn="l" defTabSz="914400" rtl="0" eaLnBrk="1" latinLnBrk="0" hangingPunct="1">
+              <a:lnSpc>
+                <a:spcPct val="90000"/>
+              </a:lnSpc>
+              <a:spcBef>
+                <a:spcPts val="500"/>
+              </a:spcBef>
+              <a:buFont typeface="Arial" panose="020B0604020202020204" pitchFamily="34" charset="0"/>
+              <a:buChar char="•"/>
+              <a:defRPr sz="2400" kern="1200">
+                <a:solidFill>
+                  <a:schemeClr val="tx1"/>
+                </a:solidFill>
+                <a:latin typeface="+mn-lt"/>
+                <a:ea typeface="+mn-ea"/>
+                <a:cs typeface="+mn-cs"/>
+              </a:defRPr>
+            </a:lvl2pPr>
+            <a:lvl3pPr marL="1143000" indent="-228600" algn="l" defTabSz="914400" rtl="0" eaLnBrk="1" latinLnBrk="0" hangingPunct="1">
+              <a:lnSpc>
+                <a:spcPct val="90000"/>
+              </a:lnSpc>
+              <a:spcBef>
+                <a:spcPts val="500"/>
+              </a:spcBef>
+              <a:buFont typeface="Arial" panose="020B0604020202020204" pitchFamily="34" charset="0"/>
+              <a:buChar char="•"/>
+              <a:defRPr sz="2000" kern="1200">
+                <a:solidFill>
+                  <a:schemeClr val="tx1"/>
+                </a:solidFill>
+                <a:latin typeface="+mn-lt"/>
+                <a:ea typeface="+mn-ea"/>
+                <a:cs typeface="+mn-cs"/>
+              </a:defRPr>
+            </a:lvl3pPr>
+            <a:lvl4pPr marL="1600200" indent="-228600" algn="l" defTabSz="914400" rtl="0" eaLnBrk="1" latinLnBrk="0" hangingPunct="1">
+              <a:lnSpc>
+                <a:spcPct val="90000"/>
+              </a:lnSpc>
+              <a:spcBef>
+                <a:spcPts val="500"/>
+              </a:spcBef>
+              <a:buFont typeface="Arial" panose="020B0604020202020204" pitchFamily="34" charset="0"/>
+              <a:buChar char="•"/>
+              <a:defRPr sz="1800" kern="1200">
+                <a:solidFill>
+                  <a:schemeClr val="tx1"/>
+                </a:solidFill>
+                <a:latin typeface="+mn-lt"/>
+                <a:ea typeface="+mn-ea"/>
+                <a:cs typeface="+mn-cs"/>
+              </a:defRPr>
+            </a:lvl4pPr>
+            <a:lvl5pPr marL="2057400" indent="-228600" algn="l" defTabSz="914400" rtl="0" eaLnBrk="1" latinLnBrk="0" hangingPunct="1">
+              <a:lnSpc>
+                <a:spcPct val="90000"/>
+              </a:lnSpc>
+              <a:spcBef>
+                <a:spcPts val="500"/>
+              </a:spcBef>
+              <a:buFont typeface="Arial" panose="020B0604020202020204" pitchFamily="34" charset="0"/>
+              <a:buChar char="•"/>
+              <a:defRPr sz="1800" kern="1200">
+                <a:solidFill>
+                  <a:schemeClr val="tx1"/>
+                </a:solidFill>
+                <a:latin typeface="+mn-lt"/>
+                <a:ea typeface="+mn-ea"/>
+                <a:cs typeface="+mn-cs"/>
+              </a:defRPr>
+            </a:lvl5pPr>
+            <a:lvl6pPr marL="2514600" indent="-228600" algn="l" defTabSz="914400" rtl="0" eaLnBrk="1" latinLnBrk="0" hangingPunct="1">
+              <a:lnSpc>
+                <a:spcPct val="90000"/>
+              </a:lnSpc>
+              <a:spcBef>
+                <a:spcPts val="500"/>
+              </a:spcBef>
+              <a:buFont typeface="Arial" panose="020B0604020202020204" pitchFamily="34" charset="0"/>
+              <a:buChar char="•"/>
+              <a:defRPr sz="1800" kern="1200">
+                <a:solidFill>
+                  <a:schemeClr val="tx1"/>
+                </a:solidFill>
+                <a:latin typeface="+mn-lt"/>
+                <a:ea typeface="+mn-ea"/>
+                <a:cs typeface="+mn-cs"/>
+              </a:defRPr>
+            </a:lvl6pPr>
+            <a:lvl7pPr marL="2971800" indent="-228600" algn="l" defTabSz="914400" rtl="0" eaLnBrk="1" latinLnBrk="0" hangingPunct="1">
+              <a:lnSpc>
+                <a:spcPct val="90000"/>
+              </a:lnSpc>
+              <a:spcBef>
+                <a:spcPts val="500"/>
+              </a:spcBef>
+              <a:buFont typeface="Arial" panose="020B0604020202020204" pitchFamily="34" charset="0"/>
+              <a:buChar char="•"/>
+              <a:defRPr sz="1800" kern="1200">
+                <a:solidFill>
+                  <a:schemeClr val="tx1"/>
+                </a:solidFill>
+                <a:latin typeface="+mn-lt"/>
+                <a:ea typeface="+mn-ea"/>
+                <a:cs typeface="+mn-cs"/>
+              </a:defRPr>
+            </a:lvl7pPr>
+            <a:lvl8pPr marL="3429000" indent="-228600" algn="l" defTabSz="914400" rtl="0" eaLnBrk="1" latinLnBrk="0" hangingPunct="1">
+              <a:lnSpc>
+                <a:spcPct val="90000"/>
+              </a:lnSpc>
+              <a:spcBef>
+                <a:spcPts val="500"/>
+              </a:spcBef>
+              <a:buFont typeface="Arial" panose="020B0604020202020204" pitchFamily="34" charset="0"/>
+              <a:buChar char="•"/>
+              <a:defRPr sz="1800" kern="1200">
+                <a:solidFill>
+                  <a:schemeClr val="tx1"/>
+                </a:solidFill>
+                <a:latin typeface="+mn-lt"/>
+                <a:ea typeface="+mn-ea"/>
+                <a:cs typeface="+mn-cs"/>
+              </a:defRPr>
+            </a:lvl8pPr>
+            <a:lvl9pPr marL="3886200" indent="-228600" algn="l" defTabSz="914400" rtl="0" eaLnBrk="1" latinLnBrk="0" hangingPunct="1">
+              <a:lnSpc>
+                <a:spcPct val="90000"/>
+              </a:lnSpc>
+              <a:spcBef>
+                <a:spcPts val="500"/>
+              </a:spcBef>
+              <a:buFont typeface="Arial" panose="020B0604020202020204" pitchFamily="34" charset="0"/>
+              <a:buChar char="•"/>
+              <a:defRPr sz="1800" kern="1200">
+                <a:solidFill>
+                  <a:schemeClr val="tx1"/>
+                </a:solidFill>
+                <a:latin typeface="+mn-lt"/>
+                <a:ea typeface="+mn-ea"/>
+                <a:cs typeface="+mn-cs"/>
+              </a:defRPr>
+            </a:lvl9pPr>
+          </a:lstStyle>
+          <a:p>
+            <a:pPr marL="0" indent="0">
+              <a:buNone/>
+            </a:pPr>
+            <a:r>
+              <a:rPr lang="pt-BR" sz="2000" dirty="0">
+                <a:solidFill>
+                  <a:schemeClr val="accent1"/>
+                </a:solidFill>
+                <a:latin typeface="Arial" panose="020B0604020202020204" pitchFamily="34" charset="0"/>
+                <a:cs typeface="Arial" panose="020B0604020202020204" pitchFamily="34" charset="0"/>
+              </a:rPr>
+              <a:t>Resultados de nDCG@10. O primeiro número é com o BM25 </a:t>
+            </a:r>
+            <a:r>
+              <a:rPr lang="pt-BR" sz="2000" dirty="0" err="1">
+                <a:solidFill>
+                  <a:schemeClr val="accent1"/>
+                </a:solidFill>
+                <a:latin typeface="Arial" panose="020B0604020202020204" pitchFamily="34" charset="0"/>
+                <a:cs typeface="Arial" panose="020B0604020202020204" pitchFamily="34" charset="0"/>
+              </a:rPr>
+              <a:t>Pyserini</a:t>
+            </a:r>
+            <a:r>
+              <a:rPr lang="pt-BR" sz="2000" dirty="0">
+                <a:solidFill>
+                  <a:schemeClr val="accent1"/>
+                </a:solidFill>
+                <a:latin typeface="Arial" panose="020B0604020202020204" pitchFamily="34" charset="0"/>
+                <a:cs typeface="Arial" panose="020B0604020202020204" pitchFamily="34" charset="0"/>
+              </a:rPr>
+              <a:t>, o segundo, quando existir, é implementação da Aula 1</a:t>
             </a:r>
           </a:p>
         </p:txBody>
@@ -12502,95 +12808,6 @@
                 <a:latin typeface="Arial" panose="020B0604020202020204" pitchFamily="34" charset="0"/>
                 <a:cs typeface="Arial" panose="020B0604020202020204" pitchFamily="34" charset="0"/>
               </a:rPr>
-              <a:t>Posso chamar </a:t>
-            </a:r>
-            <a:r>
-              <a:rPr lang="pt-BR" sz="2400" dirty="0" err="1">
-                <a:solidFill>
-                  <a:schemeClr val="accent1"/>
-                </a:solidFill>
-                <a:latin typeface="Arial" panose="020B0604020202020204" pitchFamily="34" charset="0"/>
-                <a:cs typeface="Arial" panose="020B0604020202020204" pitchFamily="34" charset="0"/>
-              </a:rPr>
-              <a:t>tokenizer</a:t>
-            </a:r>
-            <a:r>
-              <a:rPr lang="pt-BR" sz="2400" dirty="0">
-                <a:solidFill>
-                  <a:schemeClr val="accent1"/>
-                </a:solidFill>
-                <a:latin typeface="Arial" panose="020B0604020202020204" pitchFamily="34" charset="0"/>
-                <a:cs typeface="Arial" panose="020B0604020202020204" pitchFamily="34" charset="0"/>
-              </a:rPr>
-              <a:t>(f’{query} [SEP] {</a:t>
-            </a:r>
-            <a:r>
-              <a:rPr lang="pt-BR" sz="2400" dirty="0" err="1">
-                <a:solidFill>
-                  <a:schemeClr val="accent1"/>
-                </a:solidFill>
-                <a:latin typeface="Arial" panose="020B0604020202020204" pitchFamily="34" charset="0"/>
-                <a:cs typeface="Arial" panose="020B0604020202020204" pitchFamily="34" charset="0"/>
-              </a:rPr>
-              <a:t>passage</a:t>
-            </a:r>
-            <a:r>
-              <a:rPr lang="pt-BR" sz="2400" dirty="0">
-                <a:solidFill>
-                  <a:schemeClr val="accent1"/>
-                </a:solidFill>
-                <a:latin typeface="Arial" panose="020B0604020202020204" pitchFamily="34" charset="0"/>
-                <a:cs typeface="Arial" panose="020B0604020202020204" pitchFamily="34" charset="0"/>
-              </a:rPr>
-              <a:t>}’) assim mesmo ou preciso chamar como uma lista de </a:t>
-            </a:r>
-            <a:r>
-              <a:rPr lang="pt-BR" sz="2400" dirty="0" err="1">
-                <a:solidFill>
-                  <a:schemeClr val="accent1"/>
-                </a:solidFill>
-                <a:latin typeface="Arial" panose="020B0604020202020204" pitchFamily="34" charset="0"/>
-                <a:cs typeface="Arial" panose="020B0604020202020204" pitchFamily="34" charset="0"/>
-              </a:rPr>
-              <a:t>strings</a:t>
-            </a:r>
-            <a:r>
-              <a:rPr lang="pt-BR" sz="2400" dirty="0">
-                <a:solidFill>
-                  <a:schemeClr val="accent1"/>
-                </a:solidFill>
-                <a:latin typeface="Arial" panose="020B0604020202020204" pitchFamily="34" charset="0"/>
-                <a:cs typeface="Arial" panose="020B0604020202020204" pitchFamily="34" charset="0"/>
-              </a:rPr>
-              <a:t>? Qual a diferença?</a:t>
-            </a:r>
-          </a:p>
-          <a:p>
-            <a:pPr marL="457200" indent="-457200">
-              <a:buFont typeface="Arial" panose="020B0604020202020204" pitchFamily="34" charset="0"/>
-              <a:buAutoNum type="arabicPeriod"/>
-            </a:pPr>
-            <a:endParaRPr lang="pt-BR" sz="2400" dirty="0">
-              <a:solidFill>
-                <a:schemeClr val="accent1"/>
-              </a:solidFill>
-              <a:latin typeface="Arial" panose="020B0604020202020204" pitchFamily="34" charset="0"/>
-              <a:cs typeface="Arial" panose="020B0604020202020204" pitchFamily="34" charset="0"/>
-            </a:endParaRPr>
-          </a:p>
-          <a:p>
-            <a:pPr marL="457200" indent="-457200">
-              <a:buFont typeface="Arial" panose="020B0604020202020204" pitchFamily="34" charset="0"/>
-              <a:buAutoNum type="arabicPeriod"/>
-            </a:pPr>
-            <a:r>
-              <a:rPr lang="pt-BR" sz="2400" dirty="0">
-                <a:solidFill>
-                  <a:schemeClr val="accent1"/>
-                </a:solidFill>
-                <a:latin typeface="Arial" panose="020B0604020202020204" pitchFamily="34" charset="0"/>
-                <a:cs typeface="Arial" panose="020B0604020202020204" pitchFamily="34" charset="0"/>
-              </a:rPr>
               <a:t>O que exatamente é esse </a:t>
             </a:r>
             <a:r>
@@ -13145,10 +13362,122 @@
               </a:rPr>
               <a:t> são necessários? O [SEP] já não é suficiente?</a:t>
             </a:r>
-          </a:p>
-          <a:p>
-            <a:pPr marL="457200" indent="-457200">
-              <a:buAutoNum type="arabicPeriod"/>
+            <a:endParaRPr lang="pt-BR" sz="1600" dirty="0">
+              <a:solidFill>
+                <a:schemeClr val="accent1"/>
+              </a:solidFill>
+              <a:latin typeface="Arial" panose="020B0604020202020204" pitchFamily="34" charset="0"/>
+              <a:cs typeface="Arial" panose="020B0604020202020204" pitchFamily="34" charset="0"/>
+            </a:endParaRPr>
+          </a:p>
+          <a:p>
+            <a:pPr marL="0" indent="0">
+              <a:buNone/>
+            </a:pPr>
+            <a:r>
+              <a:rPr lang="pt-BR" sz="1600" dirty="0" err="1">
+                <a:solidFill>
+                  <a:schemeClr val="accent1"/>
+                </a:solidFill>
+                <a:latin typeface="Arial" panose="020B0604020202020204" pitchFamily="34" charset="0"/>
+                <a:cs typeface="Arial" panose="020B0604020202020204" pitchFamily="34" charset="0"/>
+              </a:rPr>
+              <a:t>Obs</a:t>
+            </a:r>
+            <a:r>
+              <a:rPr lang="pt-BR" sz="1600" dirty="0">
+                <a:solidFill>
+                  <a:schemeClr val="accent1"/>
+                </a:solidFill>
+                <a:latin typeface="Arial" panose="020B0604020202020204" pitchFamily="34" charset="0"/>
+                <a:cs typeface="Arial" panose="020B0604020202020204" pitchFamily="34" charset="0"/>
+              </a:rPr>
+              <a:t>: o artigo chegou a testar o efeito de não usar </a:t>
+            </a:r>
+            <a:r>
+              <a:rPr lang="pt-BR" sz="1600" dirty="0" err="1">
+                <a:solidFill>
+                  <a:schemeClr val="accent1"/>
+                </a:solidFill>
+                <a:latin typeface="Arial" panose="020B0604020202020204" pitchFamily="34" charset="0"/>
+                <a:cs typeface="Arial" panose="020B0604020202020204" pitchFamily="34" charset="0"/>
+              </a:rPr>
+              <a:t>segment</a:t>
+            </a:r>
+            <a:r>
+              <a:rPr lang="pt-BR" sz="1600" dirty="0">
+                <a:solidFill>
+                  <a:schemeClr val="accent1"/>
+                </a:solidFill>
+                <a:latin typeface="Arial" panose="020B0604020202020204" pitchFamily="34" charset="0"/>
+                <a:cs typeface="Arial" panose="020B0604020202020204" pitchFamily="34" charset="0"/>
+              </a:rPr>
+              <a:t> </a:t>
+            </a:r>
+            <a:r>
+              <a:rPr lang="pt-BR" sz="1600" dirty="0" err="1">
+                <a:solidFill>
+                  <a:schemeClr val="accent1"/>
+                </a:solidFill>
+                <a:latin typeface="Arial" panose="020B0604020202020204" pitchFamily="34" charset="0"/>
+                <a:cs typeface="Arial" panose="020B0604020202020204" pitchFamily="34" charset="0"/>
+              </a:rPr>
+              <a:t>embeddings</a:t>
+            </a:r>
+            <a:r>
+              <a:rPr lang="pt-BR" sz="1600" dirty="0">
+                <a:solidFill>
+                  <a:schemeClr val="accent1"/>
+                </a:solidFill>
+                <a:latin typeface="Arial" panose="020B0604020202020204" pitchFamily="34" charset="0"/>
+                <a:cs typeface="Arial" panose="020B0604020202020204" pitchFamily="34" charset="0"/>
+              </a:rPr>
+              <a:t>, mas e se tirasse o </a:t>
+            </a:r>
+            <a:r>
+              <a:rPr lang="pt-BR" sz="1600" dirty="0" err="1">
+                <a:solidFill>
+                  <a:schemeClr val="accent1"/>
+                </a:solidFill>
+                <a:latin typeface="Arial" panose="020B0604020202020204" pitchFamily="34" charset="0"/>
+                <a:cs typeface="Arial" panose="020B0604020202020204" pitchFamily="34" charset="0"/>
+              </a:rPr>
+              <a:t>segment</a:t>
+            </a:r>
+            <a:r>
+              <a:rPr lang="pt-BR" sz="1600" dirty="0">
+                <a:solidFill>
+                  <a:schemeClr val="accent1"/>
+                </a:solidFill>
+                <a:latin typeface="Arial" panose="020B0604020202020204" pitchFamily="34" charset="0"/>
+                <a:cs typeface="Arial" panose="020B0604020202020204" pitchFamily="34" charset="0"/>
+              </a:rPr>
+              <a:t> </a:t>
+            </a:r>
+            <a:r>
+              <a:rPr lang="pt-BR" sz="1600" dirty="0" err="1">
+                <a:solidFill>
+                  <a:schemeClr val="accent1"/>
+                </a:solidFill>
+                <a:latin typeface="Arial" panose="020B0604020202020204" pitchFamily="34" charset="0"/>
+                <a:cs typeface="Arial" panose="020B0604020202020204" pitchFamily="34" charset="0"/>
+              </a:rPr>
+              <a:t>embeddings</a:t>
+            </a:r>
+            <a:r>
+              <a:rPr lang="pt-BR" sz="1600" dirty="0">
+                <a:solidFill>
+                  <a:schemeClr val="accent1"/>
+                </a:solidFill>
+                <a:latin typeface="Arial" panose="020B0604020202020204" pitchFamily="34" charset="0"/>
+                <a:cs typeface="Arial" panose="020B0604020202020204" pitchFamily="34" charset="0"/>
+              </a:rPr>
+              <a:t> e o [SEP]?</a:t>
+            </a:r>
+          </a:p>
+          <a:p>
+            <a:pPr marL="0" indent="0">
+              <a:buNone/>
             </a:pPr>
             <a:endParaRPr lang="pt-BR" sz="2400" dirty="0">
               <a:solidFill>
@@ -14138,6 +14467,15 @@
 </file>
 
 <file path=customXml/item1.xml><?xml version="1.0" encoding="utf-8"?>
+<?mso-contentType ?>
+<FormTemplates xmlns="http://schemas.microsoft.com/sharepoint/v3/contenttype/forms">
+  <Display>DocumentLibraryForm</Display>
+  <Edit>DocumentLibraryForm</Edit>
+  <New>DocumentLibraryForm</New>
+</FormTemplates>
+</file>
+
+<file path=customXml/item2.xml><?xml version="1.0" encoding="utf-8"?>
 <ct:contentTypeSchema xmlns:ct="http://schemas.microsoft.com/office/2006/metadata/contentType" xmlns:ma="http://schemas.microsoft.com/office/2006/metadata/properties/metaAttributes" ct:_="" ma:_="" ma:contentTypeName="Document" ma:contentTypeID="0x01010079F111ED35F8CC479449609E8A0923A6" ma:contentTypeVersion="21" ma:contentTypeDescription="Create a new document." ma:contentTypeScope="" ma:versionID="64dfb1555687e0874b4304b796b5b0c7">
   <xsd:schema xmlns:xsd="http://www.w3.org/2001/XMLSchema" xmlns:xs="http://www.w3.org/2001/XMLSchema" xmlns:p="http://schemas.microsoft.com/office/2006/metadata/properties" xmlns:ns1="http://schemas.microsoft.com/sharepoint/v3" xmlns:ns2="71af3243-3dd4-4a8d-8c0d-dd76da1f02a5" xmlns:ns3="16c05727-aa75-4e4a-9b5f-8a80a1165891" xmlns:ns4="230e9df3-be65-4c73-a93b-d1236ebd677e" targetNamespace="http://schemas.microsoft.com/office/2006/metadata/properties" ma:root="true" ma:fieldsID="e6e4c555b5e194d05b7203de9c4567b3" ns1:_="" ns2:_="" ns3:_="" ns4:_="">
     <xsd:import namespace="http://schemas.microsoft.com/sharepoint/v3"/>
@@ -14419,15 +14757,6 @@
 </ct:contentTypeSchema>
 </file>
 
-<file path=customXml/item2.xml><?xml version="1.0" encoding="utf-8"?>
-<?mso-contentType ?>
-<FormTemplates xmlns="http://schemas.microsoft.com/sharepoint/v3/contenttype/forms">
-  <Display>DocumentLibraryForm</Display>
-  <Edit>DocumentLibraryForm</Edit>
-  <New>DocumentLibraryForm</New>
-</FormTemplates>
-</file>
-
 <file path=customXml/item3.xml><?xml version="1.0" encoding="utf-8"?>
 <p:properties xmlns:p="http://schemas.microsoft.com/office/2006/metadata/properties" xmlns:xsi="http://www.w3.org/2001/XMLSchema-instance" xmlns:pc="http://schemas.microsoft.com/office/infopath/2007/PartnerControls">
   <documentManagement>
@@ -14448,6 +14777,14 @@
 </file>
 
 <file path=customXml/itemProps1.xml><?xml version="1.0" encoding="utf-8"?>
+<ds:datastoreItem xmlns:ds="http://schemas.openxmlformats.org/officeDocument/2006/customXml" ds:itemID="{E618C13B-9D83-4AF4-B64D-33362D5133F8}">
+  <ds:schemaRefs>
+    <ds:schemaRef ds:uri="http://schemas.microsoft.com/sharepoint/v3/contenttype/forms"/>
+  </ds:schemaRefs>
+</ds:datastoreItem>
+</file>
+
+<file path=customXml/itemProps2.xml><?xml version="1.0" encoding="utf-8"?>
 <ds:datastoreItem xmlns:ds="http://schemas.openxmlformats.org/officeDocument/2006/customXml" ds:itemID="{67ACD96E-49A0-4DA4-A7BB-AC2D8874213F}">
   <ds:schemaRefs>
     <ds:schemaRef ds:uri="http://schemas.microsoft.com/office/2006/metadata/contentType"/>
@@ -14464,14 +14801,6 @@
     <ds:schemaRef ds:uri="http://purl.org/dc/elements/1.1/"/>
     <ds:schemaRef ds:uri="http://purl.org/dc/terms/"/>
     <ds:schemaRef ds:uri="http://schemas.microsoft.com/internal/obd"/>
-  </ds:schemaRefs>
-</ds:datastoreItem>
-</file>
-
-<file path=customXml/itemProps2.xml><?xml version="1.0" encoding="utf-8"?>
-<ds:datastoreItem xmlns:ds="http://schemas.openxmlformats.org/officeDocument/2006/customXml" ds:itemID="{E618C13B-9D83-4AF4-B64D-33362D5133F8}">
-  <ds:schemaRefs>
-    <ds:schemaRef ds:uri="http://schemas.microsoft.com/sharepoint/v3/contenttype/forms"/>
   </ds:schemaRefs>
 </ds:datastoreItem>
 </file>

</xml_diff>